<commit_message>
update earth leakage detector instructions
</commit_message>
<xml_diff>
--- a/anti-trip-earth-leakage-detector/anti-trip-earth-leakage-detector instructions.pptx
+++ b/anti-trip-earth-leakage-detector/anti-trip-earth-leakage-detector instructions.pptx
@@ -243,7 +243,7 @@
           <a:p>
             <a:fld id="{00808A92-602D-7A4F-BD0D-BC2312DEE103}" type="datetimeFigureOut">
               <a:rPr lang="en-US" smtClean="0"/>
-              <a:t>5/1/2016</a:t>
+              <a:t>5/18/2019</a:t>
             </a:fld>
             <a:endParaRPr lang="en-US"/>
           </a:p>
@@ -413,7 +413,7 @@
           <a:p>
             <a:fld id="{00808A92-602D-7A4F-BD0D-BC2312DEE103}" type="datetimeFigureOut">
               <a:rPr lang="en-US" smtClean="0"/>
-              <a:t>5/1/2016</a:t>
+              <a:t>5/18/2019</a:t>
             </a:fld>
             <a:endParaRPr lang="en-US"/>
           </a:p>
@@ -593,7 +593,7 @@
           <a:p>
             <a:fld id="{00808A92-602D-7A4F-BD0D-BC2312DEE103}" type="datetimeFigureOut">
               <a:rPr lang="en-US" smtClean="0"/>
-              <a:t>5/1/2016</a:t>
+              <a:t>5/18/2019</a:t>
             </a:fld>
             <a:endParaRPr lang="en-US"/>
           </a:p>
@@ -763,7 +763,7 @@
           <a:p>
             <a:fld id="{00808A92-602D-7A4F-BD0D-BC2312DEE103}" type="datetimeFigureOut">
               <a:rPr lang="en-US" smtClean="0"/>
-              <a:t>5/1/2016</a:t>
+              <a:t>5/18/2019</a:t>
             </a:fld>
             <a:endParaRPr lang="en-US"/>
           </a:p>
@@ -1007,7 +1007,7 @@
           <a:p>
             <a:fld id="{00808A92-602D-7A4F-BD0D-BC2312DEE103}" type="datetimeFigureOut">
               <a:rPr lang="en-US" smtClean="0"/>
-              <a:t>5/1/2016</a:t>
+              <a:t>5/18/2019</a:t>
             </a:fld>
             <a:endParaRPr lang="en-US"/>
           </a:p>
@@ -1239,7 +1239,7 @@
           <a:p>
             <a:fld id="{00808A92-602D-7A4F-BD0D-BC2312DEE103}" type="datetimeFigureOut">
               <a:rPr lang="en-US" smtClean="0"/>
-              <a:t>5/1/2016</a:t>
+              <a:t>5/18/2019</a:t>
             </a:fld>
             <a:endParaRPr lang="en-US"/>
           </a:p>
@@ -1606,7 +1606,7 @@
           <a:p>
             <a:fld id="{00808A92-602D-7A4F-BD0D-BC2312DEE103}" type="datetimeFigureOut">
               <a:rPr lang="en-US" smtClean="0"/>
-              <a:t>5/1/2016</a:t>
+              <a:t>5/18/2019</a:t>
             </a:fld>
             <a:endParaRPr lang="en-US"/>
           </a:p>
@@ -1724,7 +1724,7 @@
           <a:p>
             <a:fld id="{00808A92-602D-7A4F-BD0D-BC2312DEE103}" type="datetimeFigureOut">
               <a:rPr lang="en-US" smtClean="0"/>
-              <a:t>5/1/2016</a:t>
+              <a:t>5/18/2019</a:t>
             </a:fld>
             <a:endParaRPr lang="en-US"/>
           </a:p>
@@ -1819,7 +1819,7 @@
           <a:p>
             <a:fld id="{00808A92-602D-7A4F-BD0D-BC2312DEE103}" type="datetimeFigureOut">
               <a:rPr lang="en-US" smtClean="0"/>
-              <a:t>5/1/2016</a:t>
+              <a:t>5/18/2019</a:t>
             </a:fld>
             <a:endParaRPr lang="en-US"/>
           </a:p>
@@ -2096,7 +2096,7 @@
           <a:p>
             <a:fld id="{00808A92-602D-7A4F-BD0D-BC2312DEE103}" type="datetimeFigureOut">
               <a:rPr lang="en-US" smtClean="0"/>
-              <a:t>5/1/2016</a:t>
+              <a:t>5/18/2019</a:t>
             </a:fld>
             <a:endParaRPr lang="en-US"/>
           </a:p>
@@ -2353,7 +2353,7 @@
           <a:p>
             <a:fld id="{00808A92-602D-7A4F-BD0D-BC2312DEE103}" type="datetimeFigureOut">
               <a:rPr lang="en-US" smtClean="0"/>
-              <a:t>5/1/2016</a:t>
+              <a:t>5/18/2019</a:t>
             </a:fld>
             <a:endParaRPr lang="en-US"/>
           </a:p>
@@ -2566,7 +2566,7 @@
           <a:p>
             <a:fld id="{00808A92-602D-7A4F-BD0D-BC2312DEE103}" type="datetimeFigureOut">
               <a:rPr lang="en-US" smtClean="0"/>
-              <a:t>5/1/2016</a:t>
+              <a:t>5/18/2019</a:t>
             </a:fld>
             <a:endParaRPr lang="en-US"/>
           </a:p>
@@ -2979,7 +2979,7 @@
         </p:nvSpPr>
         <p:spPr>
           <a:xfrm>
-            <a:off x="5190395" y="-56482"/>
+            <a:off x="4703564" y="-56482"/>
             <a:ext cx="1667605" cy="369332"/>
           </a:xfrm>
           <a:prstGeom prst="rect">
@@ -3039,7 +3039,7 @@
         </p:nvSpPr>
         <p:spPr>
           <a:xfrm>
-            <a:off x="5175185" y="1051514"/>
+            <a:off x="4688354" y="1051514"/>
             <a:ext cx="1633538" cy="230832"/>
           </a:xfrm>
           <a:prstGeom prst="rect">
@@ -3094,7 +3094,7 @@
         <p:spPr>
           <a:xfrm>
             <a:off x="224351" y="-56482"/>
-            <a:ext cx="4365426" cy="1477328"/>
+            <a:ext cx="4365426" cy="1615827"/>
           </a:xfrm>
           <a:prstGeom prst="rect">
             <a:avLst/>
@@ -3294,7 +3294,34 @@
               </a:rPr>
               <a:t>. After repairing, plug the appliance to a conventional socket and verify that the breaker does not trip under normal circumstances.</a:t>
             </a:r>
-            <a:endParaRPr lang="en-US" sz="900" dirty="0">
+          </a:p>
+          <a:p>
+            <a:pPr>
+              <a:spcAft>
+                <a:spcPts val="0"/>
+              </a:spcAft>
+            </a:pPr>
+            <a:r>
+              <a:rPr lang="en-SG" sz="900" dirty="0">
+                <a:solidFill>
+                  <a:srgbClr val="141823"/>
+                </a:solidFill>
+                <a:ea typeface="Helvetica" charset="0"/>
+                <a:cs typeface="Helvetica" charset="0"/>
+              </a:rPr>
+              <a:t>8. </a:t>
+            </a:r>
+            <a:r>
+              <a:rPr lang="en-SG" sz="900" b="1" dirty="0">
+                <a:solidFill>
+                  <a:srgbClr val="141823"/>
+                </a:solidFill>
+                <a:ea typeface="Helvetica" charset="0"/>
+                <a:cs typeface="Helvetica" charset="0"/>
+              </a:rPr>
+              <a:t>ALWAYS TEST BEFORE USE</a:t>
+            </a:r>
+            <a:endParaRPr lang="en-US" sz="900" b="1" dirty="0">
               <a:effectLst/>
               <a:ea typeface="Helvetica" charset="0"/>
               <a:cs typeface="Helvetica" charset="0"/>
@@ -3318,7 +3345,7 @@
         </p:blipFill>
         <p:spPr>
           <a:xfrm>
-            <a:off x="5226188" y="256043"/>
+            <a:off x="4739357" y="256043"/>
             <a:ext cx="1582535" cy="861804"/>
           </a:xfrm>
           <a:prstGeom prst="rect">

</xml_diff>